<commit_message>
updated legend for error
</commit_message>
<xml_diff>
--- a/images/designs.pptx
+++ b/images/designs.pptx
@@ -6,11 +6,12 @@
   </p:sldMasterIdLst>
   <p:sldIdLst>
     <p:sldId id="261" r:id="rId2"/>
-    <p:sldId id="257" r:id="rId3"/>
-    <p:sldId id="262" r:id="rId4"/>
-    <p:sldId id="258" r:id="rId5"/>
-    <p:sldId id="259" r:id="rId6"/>
-    <p:sldId id="260" r:id="rId7"/>
+    <p:sldId id="263" r:id="rId3"/>
+    <p:sldId id="257" r:id="rId4"/>
+    <p:sldId id="262" r:id="rId5"/>
+    <p:sldId id="258" r:id="rId6"/>
+    <p:sldId id="259" r:id="rId7"/>
+    <p:sldId id="260" r:id="rId8"/>
   </p:sldIdLst>
   <p:sldSz cx="12192000" cy="6858000"/>
   <p:notesSz cx="6858000" cy="9144000"/>
@@ -264,7 +265,7 @@
           <a:p>
             <a:fld id="{0A38E50F-89CD-4F5B-9145-51D8E3359AEB}" type="datetimeFigureOut">
               <a:rPr lang="en-US" smtClean="0"/>
-              <a:t>5/9/2023</a:t>
+              <a:t>5/11/2023</a:t>
             </a:fld>
             <a:endParaRPr lang="en-US"/>
           </a:p>
@@ -462,7 +463,7 @@
           <a:p>
             <a:fld id="{0A38E50F-89CD-4F5B-9145-51D8E3359AEB}" type="datetimeFigureOut">
               <a:rPr lang="en-US" smtClean="0"/>
-              <a:t>5/9/2023</a:t>
+              <a:t>5/11/2023</a:t>
             </a:fld>
             <a:endParaRPr lang="en-US"/>
           </a:p>
@@ -670,7 +671,7 @@
           <a:p>
             <a:fld id="{0A38E50F-89CD-4F5B-9145-51D8E3359AEB}" type="datetimeFigureOut">
               <a:rPr lang="en-US" smtClean="0"/>
-              <a:t>5/9/2023</a:t>
+              <a:t>5/11/2023</a:t>
             </a:fld>
             <a:endParaRPr lang="en-US"/>
           </a:p>
@@ -868,7 +869,7 @@
           <a:p>
             <a:fld id="{0A38E50F-89CD-4F5B-9145-51D8E3359AEB}" type="datetimeFigureOut">
               <a:rPr lang="en-US" smtClean="0"/>
-              <a:t>5/9/2023</a:t>
+              <a:t>5/11/2023</a:t>
             </a:fld>
             <a:endParaRPr lang="en-US"/>
           </a:p>
@@ -1143,7 +1144,7 @@
           <a:p>
             <a:fld id="{0A38E50F-89CD-4F5B-9145-51D8E3359AEB}" type="datetimeFigureOut">
               <a:rPr lang="en-US" smtClean="0"/>
-              <a:t>5/9/2023</a:t>
+              <a:t>5/11/2023</a:t>
             </a:fld>
             <a:endParaRPr lang="en-US"/>
           </a:p>
@@ -1408,7 +1409,7 @@
           <a:p>
             <a:fld id="{0A38E50F-89CD-4F5B-9145-51D8E3359AEB}" type="datetimeFigureOut">
               <a:rPr lang="en-US" smtClean="0"/>
-              <a:t>5/9/2023</a:t>
+              <a:t>5/11/2023</a:t>
             </a:fld>
             <a:endParaRPr lang="en-US"/>
           </a:p>
@@ -1820,7 +1821,7 @@
           <a:p>
             <a:fld id="{0A38E50F-89CD-4F5B-9145-51D8E3359AEB}" type="datetimeFigureOut">
               <a:rPr lang="en-US" smtClean="0"/>
-              <a:t>5/9/2023</a:t>
+              <a:t>5/11/2023</a:t>
             </a:fld>
             <a:endParaRPr lang="en-US"/>
           </a:p>
@@ -1961,7 +1962,7 @@
           <a:p>
             <a:fld id="{0A38E50F-89CD-4F5B-9145-51D8E3359AEB}" type="datetimeFigureOut">
               <a:rPr lang="en-US" smtClean="0"/>
-              <a:t>5/9/2023</a:t>
+              <a:t>5/11/2023</a:t>
             </a:fld>
             <a:endParaRPr lang="en-US"/>
           </a:p>
@@ -2074,7 +2075,7 @@
           <a:p>
             <a:fld id="{0A38E50F-89CD-4F5B-9145-51D8E3359AEB}" type="datetimeFigureOut">
               <a:rPr lang="en-US" smtClean="0"/>
-              <a:t>5/9/2023</a:t>
+              <a:t>5/11/2023</a:t>
             </a:fld>
             <a:endParaRPr lang="en-US"/>
           </a:p>
@@ -2385,7 +2386,7 @@
           <a:p>
             <a:fld id="{0A38E50F-89CD-4F5B-9145-51D8E3359AEB}" type="datetimeFigureOut">
               <a:rPr lang="en-US" smtClean="0"/>
-              <a:t>5/9/2023</a:t>
+              <a:t>5/11/2023</a:t>
             </a:fld>
             <a:endParaRPr lang="en-US"/>
           </a:p>
@@ -2673,7 +2674,7 @@
           <a:p>
             <a:fld id="{0A38E50F-89CD-4F5B-9145-51D8E3359AEB}" type="datetimeFigureOut">
               <a:rPr lang="en-US" smtClean="0"/>
-              <a:t>5/9/2023</a:t>
+              <a:t>5/11/2023</a:t>
             </a:fld>
             <a:endParaRPr lang="en-US"/>
           </a:p>
@@ -2914,7 +2915,7 @@
           <a:p>
             <a:fld id="{0A38E50F-89CD-4F5B-9145-51D8E3359AEB}" type="datetimeFigureOut">
               <a:rPr lang="en-US" smtClean="0"/>
-              <a:t>5/9/2023</a:t>
+              <a:t>5/11/2023</a:t>
             </a:fld>
             <a:endParaRPr lang="en-US"/>
           </a:p>
@@ -3420,6 +3421,96 @@
           <a:chExt cx="0" cy="0"/>
         </a:xfrm>
       </p:grpSpPr>
+      <p:sp>
+        <p:nvSpPr>
+          <p:cNvPr id="4" name="TextBox 3">
+            <a:extLst>
+              <a:ext uri="{FF2B5EF4-FFF2-40B4-BE49-F238E27FC236}">
+                <a16:creationId xmlns:a16="http://schemas.microsoft.com/office/drawing/2014/main" id="{701EF086-BD79-0B87-D674-FC168F0D1BA3}"/>
+              </a:ext>
+            </a:extLst>
+          </p:cNvPr>
+          <p:cNvSpPr txBox="1"/>
+          <p:nvPr/>
+        </p:nvSpPr>
+        <p:spPr>
+          <a:xfrm>
+            <a:off x="3441940" y="1699404"/>
+            <a:ext cx="3278037" cy="954107"/>
+          </a:xfrm>
+          <a:prstGeom prst="rect">
+            <a:avLst/>
+          </a:prstGeom>
+          <a:solidFill>
+            <a:schemeClr val="bg1">
+              <a:lumMod val="75000"/>
+            </a:schemeClr>
+          </a:solidFill>
+        </p:spPr>
+        <p:txBody>
+          <a:bodyPr wrap="square" rtlCol="0">
+            <a:spAutoFit/>
+          </a:bodyPr>
+          <a:lstStyle/>
+          <a:p>
+            <a:pPr marL="285750" indent="-285750">
+              <a:buClr>
+                <a:srgbClr val="FF0000"/>
+              </a:buClr>
+              <a:buFont typeface="Arial" panose="020B0604020202020204" pitchFamily="34" charset="0"/>
+              <a:buChar char="•"/>
+            </a:pPr>
+            <a:r>
+              <a:rPr lang="en-US" sz="2800" dirty="0"/>
+              <a:t>OpenCV</a:t>
+            </a:r>
+          </a:p>
+          <a:p>
+            <a:pPr marL="285750" indent="-285750">
+              <a:buClr>
+                <a:srgbClr val="0070C0"/>
+              </a:buClr>
+              <a:buFont typeface="Arial" panose="020B0604020202020204" pitchFamily="34" charset="0"/>
+              <a:buChar char="•"/>
+            </a:pPr>
+            <a:r>
+              <a:rPr lang="en-US" sz="2800" dirty="0" err="1"/>
+              <a:t>Efovee</a:t>
+            </a:r>
+            <a:endParaRPr lang="en-US" sz="2800" dirty="0"/>
+          </a:p>
+        </p:txBody>
+      </p:sp>
+    </p:spTree>
+    <p:extLst>
+      <p:ext uri="{BB962C8B-B14F-4D97-AF65-F5344CB8AC3E}">
+        <p14:creationId xmlns:p14="http://schemas.microsoft.com/office/powerpoint/2010/main" val="2148892076"/>
+      </p:ext>
+    </p:extLst>
+  </p:cSld>
+  <p:clrMapOvr>
+    <a:masterClrMapping/>
+  </p:clrMapOvr>
+</p:sld>
+</file>
+
+<file path=ppt/slides/slide3.xml><?xml version="1.0" encoding="utf-8"?>
+<p:sld xmlns:a="http://schemas.openxmlformats.org/drawingml/2006/main" xmlns:r="http://schemas.openxmlformats.org/officeDocument/2006/relationships" xmlns:p="http://schemas.openxmlformats.org/presentationml/2006/main">
+  <p:cSld>
+    <p:spTree>
+      <p:nvGrpSpPr>
+        <p:cNvPr id="1" name=""/>
+        <p:cNvGrpSpPr/>
+        <p:nvPr/>
+      </p:nvGrpSpPr>
+      <p:grpSpPr>
+        <a:xfrm>
+          <a:off x="0" y="0"/>
+          <a:ext cx="0" cy="0"/>
+          <a:chOff x="0" y="0"/>
+          <a:chExt cx="0" cy="0"/>
+        </a:xfrm>
+      </p:grpSpPr>
       <p:pic>
         <p:nvPicPr>
           <p:cNvPr id="5" name="Graphic 4" descr="Camera outline">
@@ -4702,7 +4793,7 @@
 </p:sld>
 </file>
 
-<file path=ppt/slides/slide3.xml><?xml version="1.0" encoding="utf-8"?>
+<file path=ppt/slides/slide4.xml><?xml version="1.0" encoding="utf-8"?>
 <p:sld xmlns:a="http://schemas.openxmlformats.org/drawingml/2006/main" xmlns:r="http://schemas.openxmlformats.org/officeDocument/2006/relationships" xmlns:p="http://schemas.openxmlformats.org/presentationml/2006/main">
   <p:cSld>
     <p:spTree>
@@ -5733,7 +5824,7 @@
 </p:sld>
 </file>
 
-<file path=ppt/slides/slide4.xml><?xml version="1.0" encoding="utf-8"?>
+<file path=ppt/slides/slide5.xml><?xml version="1.0" encoding="utf-8"?>
 <p:sld xmlns:a="http://schemas.openxmlformats.org/drawingml/2006/main" xmlns:r="http://schemas.openxmlformats.org/officeDocument/2006/relationships" xmlns:p="http://schemas.openxmlformats.org/presentationml/2006/main">
   <p:cSld>
     <p:spTree>
@@ -6118,7 +6209,7 @@
 </p:sld>
 </file>
 
-<file path=ppt/slides/slide5.xml><?xml version="1.0" encoding="utf-8"?>
+<file path=ppt/slides/slide6.xml><?xml version="1.0" encoding="utf-8"?>
 <p:sld xmlns:a="http://schemas.openxmlformats.org/drawingml/2006/main" xmlns:r="http://schemas.openxmlformats.org/officeDocument/2006/relationships" xmlns:p="http://schemas.openxmlformats.org/presentationml/2006/main">
   <p:cSld>
     <p:spTree>
@@ -6503,7 +6594,7 @@
 </p:sld>
 </file>
 
-<file path=ppt/slides/slide6.xml><?xml version="1.0" encoding="utf-8"?>
+<file path=ppt/slides/slide7.xml><?xml version="1.0" encoding="utf-8"?>
 <p:sld xmlns:a="http://schemas.openxmlformats.org/drawingml/2006/main" xmlns:r="http://schemas.openxmlformats.org/officeDocument/2006/relationships" xmlns:p="http://schemas.openxmlformats.org/presentationml/2006/main">
   <p:cSld>
     <p:spTree>

</xml_diff>

<commit_message>
updated gif on about section
</commit_message>
<xml_diff>
--- a/images/designs.pptx
+++ b/images/designs.pptx
@@ -265,7 +265,7 @@
           <a:p>
             <a:fld id="{0A38E50F-89CD-4F5B-9145-51D8E3359AEB}" type="datetimeFigureOut">
               <a:rPr lang="en-US" smtClean="0"/>
-              <a:t>5/19/2023</a:t>
+              <a:t>5/25/2023</a:t>
             </a:fld>
             <a:endParaRPr lang="en-US"/>
           </a:p>
@@ -463,7 +463,7 @@
           <a:p>
             <a:fld id="{0A38E50F-89CD-4F5B-9145-51D8E3359AEB}" type="datetimeFigureOut">
               <a:rPr lang="en-US" smtClean="0"/>
-              <a:t>5/19/2023</a:t>
+              <a:t>5/25/2023</a:t>
             </a:fld>
             <a:endParaRPr lang="en-US"/>
           </a:p>
@@ -671,7 +671,7 @@
           <a:p>
             <a:fld id="{0A38E50F-89CD-4F5B-9145-51D8E3359AEB}" type="datetimeFigureOut">
               <a:rPr lang="en-US" smtClean="0"/>
-              <a:t>5/19/2023</a:t>
+              <a:t>5/25/2023</a:t>
             </a:fld>
             <a:endParaRPr lang="en-US"/>
           </a:p>
@@ -869,7 +869,7 @@
           <a:p>
             <a:fld id="{0A38E50F-89CD-4F5B-9145-51D8E3359AEB}" type="datetimeFigureOut">
               <a:rPr lang="en-US" smtClean="0"/>
-              <a:t>5/19/2023</a:t>
+              <a:t>5/25/2023</a:t>
             </a:fld>
             <a:endParaRPr lang="en-US"/>
           </a:p>
@@ -1144,7 +1144,7 @@
           <a:p>
             <a:fld id="{0A38E50F-89CD-4F5B-9145-51D8E3359AEB}" type="datetimeFigureOut">
               <a:rPr lang="en-US" smtClean="0"/>
-              <a:t>5/19/2023</a:t>
+              <a:t>5/25/2023</a:t>
             </a:fld>
             <a:endParaRPr lang="en-US"/>
           </a:p>
@@ -1409,7 +1409,7 @@
           <a:p>
             <a:fld id="{0A38E50F-89CD-4F5B-9145-51D8E3359AEB}" type="datetimeFigureOut">
               <a:rPr lang="en-US" smtClean="0"/>
-              <a:t>5/19/2023</a:t>
+              <a:t>5/25/2023</a:t>
             </a:fld>
             <a:endParaRPr lang="en-US"/>
           </a:p>
@@ -1821,7 +1821,7 @@
           <a:p>
             <a:fld id="{0A38E50F-89CD-4F5B-9145-51D8E3359AEB}" type="datetimeFigureOut">
               <a:rPr lang="en-US" smtClean="0"/>
-              <a:t>5/19/2023</a:t>
+              <a:t>5/25/2023</a:t>
             </a:fld>
             <a:endParaRPr lang="en-US"/>
           </a:p>
@@ -1962,7 +1962,7 @@
           <a:p>
             <a:fld id="{0A38E50F-89CD-4F5B-9145-51D8E3359AEB}" type="datetimeFigureOut">
               <a:rPr lang="en-US" smtClean="0"/>
-              <a:t>5/19/2023</a:t>
+              <a:t>5/25/2023</a:t>
             </a:fld>
             <a:endParaRPr lang="en-US"/>
           </a:p>
@@ -2075,7 +2075,7 @@
           <a:p>
             <a:fld id="{0A38E50F-89CD-4F5B-9145-51D8E3359AEB}" type="datetimeFigureOut">
               <a:rPr lang="en-US" smtClean="0"/>
-              <a:t>5/19/2023</a:t>
+              <a:t>5/25/2023</a:t>
             </a:fld>
             <a:endParaRPr lang="en-US"/>
           </a:p>
@@ -2386,7 +2386,7 @@
           <a:p>
             <a:fld id="{0A38E50F-89CD-4F5B-9145-51D8E3359AEB}" type="datetimeFigureOut">
               <a:rPr lang="en-US" smtClean="0"/>
-              <a:t>5/19/2023</a:t>
+              <a:t>5/25/2023</a:t>
             </a:fld>
             <a:endParaRPr lang="en-US"/>
           </a:p>
@@ -2674,7 +2674,7 @@
           <a:p>
             <a:fld id="{0A38E50F-89CD-4F5B-9145-51D8E3359AEB}" type="datetimeFigureOut">
               <a:rPr lang="en-US" smtClean="0"/>
-              <a:t>5/19/2023</a:t>
+              <a:t>5/25/2023</a:t>
             </a:fld>
             <a:endParaRPr lang="en-US"/>
           </a:p>
@@ -2915,7 +2915,7 @@
           <a:p>
             <a:fld id="{0A38E50F-89CD-4F5B-9145-51D8E3359AEB}" type="datetimeFigureOut">
               <a:rPr lang="en-US" smtClean="0"/>
-              <a:t>5/19/2023</a:t>
+              <a:t>5/25/2023</a:t>
             </a:fld>
             <a:endParaRPr lang="en-US"/>
           </a:p>
@@ -5843,6 +5843,60 @@
       </p:grpSpPr>
       <p:sp>
         <p:nvSpPr>
+          <p:cNvPr id="6" name="Rectangle 5">
+            <a:extLst>
+              <a:ext uri="{FF2B5EF4-FFF2-40B4-BE49-F238E27FC236}">
+                <a16:creationId xmlns:a16="http://schemas.microsoft.com/office/drawing/2014/main" id="{999D4E82-F83E-8F1D-5DAE-BB185F7DB680}"/>
+              </a:ext>
+            </a:extLst>
+          </p:cNvPr>
+          <p:cNvSpPr/>
+          <p:nvPr/>
+        </p:nvSpPr>
+        <p:spPr>
+          <a:xfrm>
+            <a:off x="-51758" y="-69011"/>
+            <a:ext cx="12344400" cy="6940296"/>
+          </a:xfrm>
+          <a:prstGeom prst="rect">
+            <a:avLst/>
+          </a:prstGeom>
+          <a:solidFill>
+            <a:srgbClr val="323232"/>
+          </a:solidFill>
+          <a:ln>
+            <a:solidFill>
+              <a:srgbClr val="323232"/>
+            </a:solidFill>
+          </a:ln>
+        </p:spPr>
+        <p:style>
+          <a:lnRef idx="2">
+            <a:schemeClr val="accent1">
+              <a:shade val="50000"/>
+            </a:schemeClr>
+          </a:lnRef>
+          <a:fillRef idx="1">
+            <a:schemeClr val="accent1"/>
+          </a:fillRef>
+          <a:effectRef idx="0">
+            <a:schemeClr val="accent1"/>
+          </a:effectRef>
+          <a:fontRef idx="minor">
+            <a:schemeClr val="lt1"/>
+          </a:fontRef>
+        </p:style>
+        <p:txBody>
+          <a:bodyPr rtlCol="0" anchor="ctr"/>
+          <a:lstStyle/>
+          <a:p>
+            <a:pPr algn="ctr"/>
+            <a:endParaRPr lang="en-US"/>
+          </a:p>
+        </p:txBody>
+      </p:sp>
+      <p:sp>
+        <p:nvSpPr>
           <p:cNvPr id="2" name="Rectangle: Rounded Corners 1">
             <a:extLst>
               <a:ext uri="{FF2B5EF4-FFF2-40B4-BE49-F238E27FC236}">
@@ -5968,7 +6022,7 @@
           </a:prstGeom>
           <a:ln w="28575">
             <a:solidFill>
-              <a:srgbClr val="FF0000"/>
+              <a:srgbClr val="C00000"/>
             </a:solidFill>
             <a:prstDash val="lgDashDotDot"/>
           </a:ln>
@@ -6012,7 +6066,7 @@
           </a:prstGeom>
           <a:ln w="28575">
             <a:solidFill>
-              <a:srgbClr val="FF0000"/>
+              <a:srgbClr val="C00000"/>
             </a:solidFill>
             <a:prstDash val="lgDashDotDot"/>
           </a:ln>
@@ -6096,7 +6150,7 @@
           </a:prstGeom>
           <a:ln w="28575">
             <a:solidFill>
-              <a:srgbClr val="FF0000"/>
+              <a:srgbClr val="C00000"/>
             </a:solidFill>
             <a:prstDash val="lgDashDotDot"/>
           </a:ln>
@@ -6140,7 +6194,7 @@
           </a:prstGeom>
           <a:ln w="28575">
             <a:solidFill>
-              <a:srgbClr val="FF0000"/>
+              <a:srgbClr val="C00000"/>
             </a:solidFill>
             <a:prstDash val="lgDashDotDot"/>
           </a:ln>
@@ -6174,7 +6228,7 @@
         </p:nvSpPr>
         <p:spPr>
           <a:xfrm>
-            <a:off x="5065289" y="306566"/>
+            <a:off x="4179427" y="197937"/>
             <a:ext cx="3424830" cy="523220"/>
           </a:xfrm>
           <a:prstGeom prst="rect">
@@ -6190,12 +6244,52 @@
           <a:p>
             <a:pPr algn="ctr"/>
             <a:r>
-              <a:rPr lang="en-US" sz="2800" b="1" dirty="0"/>
+              <a:rPr lang="en-US" sz="2800" b="1" dirty="0">
+                <a:solidFill>
+                  <a:schemeClr val="bg2"/>
+                </a:solidFill>
+              </a:rPr>
               <a:t>Example Capture Plan</a:t>
             </a:r>
           </a:p>
         </p:txBody>
       </p:sp>
+      <p:pic>
+        <p:nvPicPr>
+          <p:cNvPr id="5" name="Picture 4" descr="A black and white checkered pattern&#10;&#10;Description automatically generated with medium confidence">
+            <a:extLst>
+              <a:ext uri="{FF2B5EF4-FFF2-40B4-BE49-F238E27FC236}">
+                <a16:creationId xmlns:a16="http://schemas.microsoft.com/office/drawing/2014/main" id="{282979B1-6273-6D32-DA98-38BCE359BA9D}"/>
+              </a:ext>
+            </a:extLst>
+          </p:cNvPr>
+          <p:cNvPicPr>
+            <a:picLocks noChangeAspect="1"/>
+          </p:cNvPicPr>
+          <p:nvPr/>
+        </p:nvPicPr>
+        <p:blipFill>
+          <a:blip r:embed="rId5">
+            <a:extLst>
+              <a:ext uri="{28A0092B-C50C-407E-A947-70E740481C1C}">
+                <a14:useLocalDpi xmlns:a14="http://schemas.microsoft.com/office/drawing/2010/main" val="0"/>
+              </a:ext>
+            </a:extLst>
+          </a:blip>
+          <a:stretch>
+            <a:fillRect/>
+          </a:stretch>
+        </p:blipFill>
+        <p:spPr>
+          <a:xfrm>
+            <a:off x="-51758" y="6866091"/>
+            <a:ext cx="12353636" cy="6948920"/>
+          </a:xfrm>
+          <a:prstGeom prst="rect">
+            <a:avLst/>
+          </a:prstGeom>
+        </p:spPr>
+      </p:pic>
     </p:spTree>
     <p:extLst>
       <p:ext uri="{BB962C8B-B14F-4D97-AF65-F5344CB8AC3E}">
@@ -6226,6 +6320,60 @@
           <a:chExt cx="0" cy="0"/>
         </a:xfrm>
       </p:grpSpPr>
+      <p:sp>
+        <p:nvSpPr>
+          <p:cNvPr id="10" name="Rectangle 9">
+            <a:extLst>
+              <a:ext uri="{FF2B5EF4-FFF2-40B4-BE49-F238E27FC236}">
+                <a16:creationId xmlns:a16="http://schemas.microsoft.com/office/drawing/2014/main" id="{EDDB9020-8B26-5237-F91C-0A5AFAF357A5}"/>
+              </a:ext>
+            </a:extLst>
+          </p:cNvPr>
+          <p:cNvSpPr/>
+          <p:nvPr/>
+        </p:nvSpPr>
+        <p:spPr>
+          <a:xfrm>
+            <a:off x="-51758" y="-69011"/>
+            <a:ext cx="12344400" cy="6940296"/>
+          </a:xfrm>
+          <a:prstGeom prst="rect">
+            <a:avLst/>
+          </a:prstGeom>
+          <a:solidFill>
+            <a:srgbClr val="323232"/>
+          </a:solidFill>
+          <a:ln>
+            <a:solidFill>
+              <a:srgbClr val="323232"/>
+            </a:solidFill>
+          </a:ln>
+        </p:spPr>
+        <p:style>
+          <a:lnRef idx="2">
+            <a:schemeClr val="accent1">
+              <a:shade val="50000"/>
+            </a:schemeClr>
+          </a:lnRef>
+          <a:fillRef idx="1">
+            <a:schemeClr val="accent1"/>
+          </a:fillRef>
+          <a:effectRef idx="0">
+            <a:schemeClr val="accent1"/>
+          </a:effectRef>
+          <a:fontRef idx="minor">
+            <a:schemeClr val="lt1"/>
+          </a:fontRef>
+        </p:style>
+        <p:txBody>
+          <a:bodyPr rtlCol="0" anchor="ctr"/>
+          <a:lstStyle/>
+          <a:p>
+            <a:pPr algn="ctr"/>
+            <a:endParaRPr lang="en-US"/>
+          </a:p>
+        </p:txBody>
+      </p:sp>
       <p:pic>
         <p:nvPicPr>
           <p:cNvPr id="2" name="Graphic 1" descr="Camera outline">
@@ -6269,42 +6417,6 @@
           </a:scene3d>
         </p:spPr>
       </p:pic>
-      <p:sp>
-        <p:nvSpPr>
-          <p:cNvPr id="3" name="TextBox 2">
-            <a:extLst>
-              <a:ext uri="{FF2B5EF4-FFF2-40B4-BE49-F238E27FC236}">
-                <a16:creationId xmlns:a16="http://schemas.microsoft.com/office/drawing/2014/main" id="{6104178C-30C6-B9D6-EAD0-C1A1A7DD95D3}"/>
-              </a:ext>
-            </a:extLst>
-          </p:cNvPr>
-          <p:cNvSpPr txBox="1"/>
-          <p:nvPr/>
-        </p:nvSpPr>
-        <p:spPr>
-          <a:xfrm>
-            <a:off x="5065289" y="306566"/>
-            <a:ext cx="3424830" cy="523220"/>
-          </a:xfrm>
-          <a:prstGeom prst="rect">
-            <a:avLst/>
-          </a:prstGeom>
-          <a:noFill/>
-        </p:spPr>
-        <p:txBody>
-          <a:bodyPr wrap="square" rtlCol="0">
-            <a:spAutoFit/>
-          </a:bodyPr>
-          <a:lstStyle/>
-          <a:p>
-            <a:pPr algn="ctr"/>
-            <a:r>
-              <a:rPr lang="en-US" sz="2800" b="1" dirty="0"/>
-              <a:t>Example Capture Plan</a:t>
-            </a:r>
-          </a:p>
-        </p:txBody>
-      </p:sp>
       <p:sp>
         <p:nvSpPr>
           <p:cNvPr id="4" name="Rectangle: Rounded Corners 3">
@@ -6389,7 +6501,7 @@
           </a:prstGeom>
           <a:ln w="28575">
             <a:solidFill>
-              <a:srgbClr val="FF0000"/>
+              <a:srgbClr val="C00000"/>
             </a:solidFill>
             <a:prstDash val="lgDashDotDot"/>
           </a:ln>
@@ -6433,7 +6545,7 @@
           </a:prstGeom>
           <a:ln w="28575">
             <a:solidFill>
-              <a:srgbClr val="FF0000"/>
+              <a:srgbClr val="C00000"/>
             </a:solidFill>
             <a:prstDash val="lgDashDotDot"/>
           </a:ln>
@@ -6517,7 +6629,7 @@
           </a:prstGeom>
           <a:ln w="28575">
             <a:solidFill>
-              <a:srgbClr val="FF0000"/>
+              <a:srgbClr val="C00000"/>
             </a:solidFill>
             <a:prstDash val="lgDashDotDot"/>
           </a:ln>
@@ -6561,7 +6673,7 @@
           </a:prstGeom>
           <a:ln w="28575">
             <a:solidFill>
-              <a:srgbClr val="FF0000"/>
+              <a:srgbClr val="C00000"/>
             </a:solidFill>
             <a:prstDash val="lgDashDotDot"/>
           </a:ln>
@@ -6581,6 +6693,82 @@
           </a:fontRef>
         </p:style>
       </p:cxnSp>
+      <p:pic>
+        <p:nvPicPr>
+          <p:cNvPr id="8" name="Picture 7" descr="A black and white checkered pattern&#10;&#10;Description automatically generated with medium confidence">
+            <a:extLst>
+              <a:ext uri="{FF2B5EF4-FFF2-40B4-BE49-F238E27FC236}">
+                <a16:creationId xmlns:a16="http://schemas.microsoft.com/office/drawing/2014/main" id="{2B21CCB4-5B48-3152-C100-320905B4123E}"/>
+              </a:ext>
+            </a:extLst>
+          </p:cNvPr>
+          <p:cNvPicPr>
+            <a:picLocks noChangeAspect="1"/>
+          </p:cNvPicPr>
+          <p:nvPr/>
+        </p:nvPicPr>
+        <p:blipFill>
+          <a:blip r:embed="rId5">
+            <a:extLst>
+              <a:ext uri="{28A0092B-C50C-407E-A947-70E740481C1C}">
+                <a14:useLocalDpi xmlns:a14="http://schemas.microsoft.com/office/drawing/2010/main" val="0"/>
+              </a:ext>
+            </a:extLst>
+          </a:blip>
+          <a:stretch>
+            <a:fillRect/>
+          </a:stretch>
+        </p:blipFill>
+        <p:spPr>
+          <a:xfrm>
+            <a:off x="-58817" y="6871285"/>
+            <a:ext cx="12360695" cy="6952891"/>
+          </a:xfrm>
+          <a:prstGeom prst="rect">
+            <a:avLst/>
+          </a:prstGeom>
+        </p:spPr>
+      </p:pic>
+      <p:sp>
+        <p:nvSpPr>
+          <p:cNvPr id="11" name="TextBox 10">
+            <a:extLst>
+              <a:ext uri="{FF2B5EF4-FFF2-40B4-BE49-F238E27FC236}">
+                <a16:creationId xmlns:a16="http://schemas.microsoft.com/office/drawing/2014/main" id="{DD0D89B9-B43F-5312-1ECB-7A6F2870D5DF}"/>
+              </a:ext>
+            </a:extLst>
+          </p:cNvPr>
+          <p:cNvSpPr txBox="1"/>
+          <p:nvPr/>
+        </p:nvSpPr>
+        <p:spPr>
+          <a:xfrm>
+            <a:off x="4179427" y="197937"/>
+            <a:ext cx="3424830" cy="523220"/>
+          </a:xfrm>
+          <a:prstGeom prst="rect">
+            <a:avLst/>
+          </a:prstGeom>
+          <a:noFill/>
+        </p:spPr>
+        <p:txBody>
+          <a:bodyPr wrap="square" rtlCol="0">
+            <a:spAutoFit/>
+          </a:bodyPr>
+          <a:lstStyle/>
+          <a:p>
+            <a:pPr algn="ctr"/>
+            <a:r>
+              <a:rPr lang="en-US" sz="2800" b="1" dirty="0">
+                <a:solidFill>
+                  <a:schemeClr val="bg2"/>
+                </a:solidFill>
+              </a:rPr>
+              <a:t>Example Capture Plan</a:t>
+            </a:r>
+          </a:p>
+        </p:txBody>
+      </p:sp>
     </p:spTree>
     <p:extLst>
       <p:ext uri="{BB962C8B-B14F-4D97-AF65-F5344CB8AC3E}">
@@ -6611,6 +6799,60 @@
           <a:chExt cx="0" cy="0"/>
         </a:xfrm>
       </p:grpSpPr>
+      <p:sp>
+        <p:nvSpPr>
+          <p:cNvPr id="10" name="Rectangle 9">
+            <a:extLst>
+              <a:ext uri="{FF2B5EF4-FFF2-40B4-BE49-F238E27FC236}">
+                <a16:creationId xmlns:a16="http://schemas.microsoft.com/office/drawing/2014/main" id="{E3439607-3042-FFC3-AD3A-19E1629382AB}"/>
+              </a:ext>
+            </a:extLst>
+          </p:cNvPr>
+          <p:cNvSpPr/>
+          <p:nvPr/>
+        </p:nvSpPr>
+        <p:spPr>
+          <a:xfrm>
+            <a:off x="-51758" y="-69011"/>
+            <a:ext cx="12344400" cy="6940296"/>
+          </a:xfrm>
+          <a:prstGeom prst="rect">
+            <a:avLst/>
+          </a:prstGeom>
+          <a:solidFill>
+            <a:srgbClr val="323232"/>
+          </a:solidFill>
+          <a:ln>
+            <a:solidFill>
+              <a:srgbClr val="323232"/>
+            </a:solidFill>
+          </a:ln>
+        </p:spPr>
+        <p:style>
+          <a:lnRef idx="2">
+            <a:schemeClr val="accent1">
+              <a:shade val="50000"/>
+            </a:schemeClr>
+          </a:lnRef>
+          <a:fillRef idx="1">
+            <a:schemeClr val="accent1"/>
+          </a:fillRef>
+          <a:effectRef idx="0">
+            <a:schemeClr val="accent1"/>
+          </a:effectRef>
+          <a:fontRef idx="minor">
+            <a:schemeClr val="lt1"/>
+          </a:fontRef>
+        </p:style>
+        <p:txBody>
+          <a:bodyPr rtlCol="0" anchor="ctr"/>
+          <a:lstStyle/>
+          <a:p>
+            <a:pPr algn="ctr"/>
+            <a:endParaRPr lang="en-US"/>
+          </a:p>
+        </p:txBody>
+      </p:sp>
       <p:pic>
         <p:nvPicPr>
           <p:cNvPr id="5" name="Graphic 4" descr="Camera outline">
@@ -6654,42 +6896,6 @@
           </a:scene3d>
         </p:spPr>
       </p:pic>
-      <p:sp>
-        <p:nvSpPr>
-          <p:cNvPr id="7" name="TextBox 6">
-            <a:extLst>
-              <a:ext uri="{FF2B5EF4-FFF2-40B4-BE49-F238E27FC236}">
-                <a16:creationId xmlns:a16="http://schemas.microsoft.com/office/drawing/2014/main" id="{5F0FA0C0-4396-C7D7-5EA3-F637CD6AA96D}"/>
-              </a:ext>
-            </a:extLst>
-          </p:cNvPr>
-          <p:cNvSpPr txBox="1"/>
-          <p:nvPr/>
-        </p:nvSpPr>
-        <p:spPr>
-          <a:xfrm>
-            <a:off x="5065289" y="306566"/>
-            <a:ext cx="3424830" cy="523220"/>
-          </a:xfrm>
-          <a:prstGeom prst="rect">
-            <a:avLst/>
-          </a:prstGeom>
-          <a:noFill/>
-        </p:spPr>
-        <p:txBody>
-          <a:bodyPr wrap="square" rtlCol="0">
-            <a:spAutoFit/>
-          </a:bodyPr>
-          <a:lstStyle/>
-          <a:p>
-            <a:pPr algn="ctr"/>
-            <a:r>
-              <a:rPr lang="en-US" sz="2800" b="1" dirty="0"/>
-              <a:t>Example Capture Plan</a:t>
-            </a:r>
-          </a:p>
-        </p:txBody>
-      </p:sp>
       <p:sp>
         <p:nvSpPr>
           <p:cNvPr id="4" name="Rectangle: Rounded Corners 3">
@@ -6774,7 +6980,7 @@
           </a:prstGeom>
           <a:ln w="28575">
             <a:solidFill>
-              <a:srgbClr val="FF0000"/>
+              <a:srgbClr val="C00000"/>
             </a:solidFill>
             <a:prstDash val="lgDashDotDot"/>
           </a:ln>
@@ -6818,7 +7024,7 @@
           </a:prstGeom>
           <a:ln w="28575">
             <a:solidFill>
-              <a:srgbClr val="FF0000"/>
+              <a:srgbClr val="C00000"/>
             </a:solidFill>
             <a:prstDash val="lgDashDotDot"/>
           </a:ln>
@@ -6902,7 +7108,7 @@
           </a:prstGeom>
           <a:ln w="28575">
             <a:solidFill>
-              <a:srgbClr val="FF0000"/>
+              <a:srgbClr val="C00000"/>
             </a:solidFill>
             <a:prstDash val="lgDashDotDot"/>
           </a:ln>
@@ -6946,7 +7152,7 @@
           </a:prstGeom>
           <a:ln w="28575">
             <a:solidFill>
-              <a:srgbClr val="FF0000"/>
+              <a:srgbClr val="C00000"/>
             </a:solidFill>
             <a:prstDash val="lgDashDotDot"/>
           </a:ln>
@@ -6966,6 +7172,82 @@
           </a:fontRef>
         </p:style>
       </p:cxnSp>
+      <p:pic>
+        <p:nvPicPr>
+          <p:cNvPr id="3" name="Picture 2" descr="A black and white checkered pattern&#10;&#10;Description automatically generated with medium confidence">
+            <a:extLst>
+              <a:ext uri="{FF2B5EF4-FFF2-40B4-BE49-F238E27FC236}">
+                <a16:creationId xmlns:a16="http://schemas.microsoft.com/office/drawing/2014/main" id="{260D3C68-005B-118B-A561-7E754E279029}"/>
+              </a:ext>
+            </a:extLst>
+          </p:cNvPr>
+          <p:cNvPicPr>
+            <a:picLocks noChangeAspect="1"/>
+          </p:cNvPicPr>
+          <p:nvPr/>
+        </p:nvPicPr>
+        <p:blipFill>
+          <a:blip r:embed="rId5">
+            <a:extLst>
+              <a:ext uri="{28A0092B-C50C-407E-A947-70E740481C1C}">
+                <a14:useLocalDpi xmlns:a14="http://schemas.microsoft.com/office/drawing/2010/main" val="0"/>
+              </a:ext>
+            </a:extLst>
+          </a:blip>
+          <a:stretch>
+            <a:fillRect/>
+          </a:stretch>
+        </p:blipFill>
+        <p:spPr>
+          <a:xfrm>
+            <a:off x="-51758" y="6866090"/>
+            <a:ext cx="12353636" cy="6948919"/>
+          </a:xfrm>
+          <a:prstGeom prst="rect">
+            <a:avLst/>
+          </a:prstGeom>
+        </p:spPr>
+      </p:pic>
+      <p:sp>
+        <p:nvSpPr>
+          <p:cNvPr id="11" name="TextBox 10">
+            <a:extLst>
+              <a:ext uri="{FF2B5EF4-FFF2-40B4-BE49-F238E27FC236}">
+                <a16:creationId xmlns:a16="http://schemas.microsoft.com/office/drawing/2014/main" id="{9E7287D1-759A-05E5-FEE9-5EB52DCAD8CE}"/>
+              </a:ext>
+            </a:extLst>
+          </p:cNvPr>
+          <p:cNvSpPr txBox="1"/>
+          <p:nvPr/>
+        </p:nvSpPr>
+        <p:spPr>
+          <a:xfrm>
+            <a:off x="4179427" y="197937"/>
+            <a:ext cx="3424830" cy="523220"/>
+          </a:xfrm>
+          <a:prstGeom prst="rect">
+            <a:avLst/>
+          </a:prstGeom>
+          <a:noFill/>
+        </p:spPr>
+        <p:txBody>
+          <a:bodyPr wrap="square" rtlCol="0">
+            <a:spAutoFit/>
+          </a:bodyPr>
+          <a:lstStyle/>
+          <a:p>
+            <a:pPr algn="ctr"/>
+            <a:r>
+              <a:rPr lang="en-US" sz="2800" b="1" dirty="0">
+                <a:solidFill>
+                  <a:schemeClr val="bg2"/>
+                </a:solidFill>
+              </a:rPr>
+              <a:t>Example Capture Plan</a:t>
+            </a:r>
+          </a:p>
+        </p:txBody>
+      </p:sp>
     </p:spTree>
     <p:extLst>
       <p:ext uri="{BB962C8B-B14F-4D97-AF65-F5344CB8AC3E}">

</xml_diff>

<commit_message>
further updated animations, and rebranded a bit
</commit_message>
<xml_diff>
--- a/images/designs.pptx
+++ b/images/designs.pptx
@@ -265,7 +265,7 @@
           <a:p>
             <a:fld id="{0A38E50F-89CD-4F5B-9145-51D8E3359AEB}" type="datetimeFigureOut">
               <a:rPr lang="en-US" smtClean="0"/>
-              <a:t>5/27/2023</a:t>
+              <a:t>5/28/2023</a:t>
             </a:fld>
             <a:endParaRPr lang="en-US"/>
           </a:p>
@@ -463,7 +463,7 @@
           <a:p>
             <a:fld id="{0A38E50F-89CD-4F5B-9145-51D8E3359AEB}" type="datetimeFigureOut">
               <a:rPr lang="en-US" smtClean="0"/>
-              <a:t>5/27/2023</a:t>
+              <a:t>5/28/2023</a:t>
             </a:fld>
             <a:endParaRPr lang="en-US"/>
           </a:p>
@@ -671,7 +671,7 @@
           <a:p>
             <a:fld id="{0A38E50F-89CD-4F5B-9145-51D8E3359AEB}" type="datetimeFigureOut">
               <a:rPr lang="en-US" smtClean="0"/>
-              <a:t>5/27/2023</a:t>
+              <a:t>5/28/2023</a:t>
             </a:fld>
             <a:endParaRPr lang="en-US"/>
           </a:p>
@@ -869,7 +869,7 @@
           <a:p>
             <a:fld id="{0A38E50F-89CD-4F5B-9145-51D8E3359AEB}" type="datetimeFigureOut">
               <a:rPr lang="en-US" smtClean="0"/>
-              <a:t>5/27/2023</a:t>
+              <a:t>5/28/2023</a:t>
             </a:fld>
             <a:endParaRPr lang="en-US"/>
           </a:p>
@@ -1144,7 +1144,7 @@
           <a:p>
             <a:fld id="{0A38E50F-89CD-4F5B-9145-51D8E3359AEB}" type="datetimeFigureOut">
               <a:rPr lang="en-US" smtClean="0"/>
-              <a:t>5/27/2023</a:t>
+              <a:t>5/28/2023</a:t>
             </a:fld>
             <a:endParaRPr lang="en-US"/>
           </a:p>
@@ -1409,7 +1409,7 @@
           <a:p>
             <a:fld id="{0A38E50F-89CD-4F5B-9145-51D8E3359AEB}" type="datetimeFigureOut">
               <a:rPr lang="en-US" smtClean="0"/>
-              <a:t>5/27/2023</a:t>
+              <a:t>5/28/2023</a:t>
             </a:fld>
             <a:endParaRPr lang="en-US"/>
           </a:p>
@@ -1821,7 +1821,7 @@
           <a:p>
             <a:fld id="{0A38E50F-89CD-4F5B-9145-51D8E3359AEB}" type="datetimeFigureOut">
               <a:rPr lang="en-US" smtClean="0"/>
-              <a:t>5/27/2023</a:t>
+              <a:t>5/28/2023</a:t>
             </a:fld>
             <a:endParaRPr lang="en-US"/>
           </a:p>
@@ -1962,7 +1962,7 @@
           <a:p>
             <a:fld id="{0A38E50F-89CD-4F5B-9145-51D8E3359AEB}" type="datetimeFigureOut">
               <a:rPr lang="en-US" smtClean="0"/>
-              <a:t>5/27/2023</a:t>
+              <a:t>5/28/2023</a:t>
             </a:fld>
             <a:endParaRPr lang="en-US"/>
           </a:p>
@@ -2075,7 +2075,7 @@
           <a:p>
             <a:fld id="{0A38E50F-89CD-4F5B-9145-51D8E3359AEB}" type="datetimeFigureOut">
               <a:rPr lang="en-US" smtClean="0"/>
-              <a:t>5/27/2023</a:t>
+              <a:t>5/28/2023</a:t>
             </a:fld>
             <a:endParaRPr lang="en-US"/>
           </a:p>
@@ -2386,7 +2386,7 @@
           <a:p>
             <a:fld id="{0A38E50F-89CD-4F5B-9145-51D8E3359AEB}" type="datetimeFigureOut">
               <a:rPr lang="en-US" smtClean="0"/>
-              <a:t>5/27/2023</a:t>
+              <a:t>5/28/2023</a:t>
             </a:fld>
             <a:endParaRPr lang="en-US"/>
           </a:p>
@@ -2674,7 +2674,7 @@
           <a:p>
             <a:fld id="{0A38E50F-89CD-4F5B-9145-51D8E3359AEB}" type="datetimeFigureOut">
               <a:rPr lang="en-US" smtClean="0"/>
-              <a:t>5/27/2023</a:t>
+              <a:t>5/28/2023</a:t>
             </a:fld>
             <a:endParaRPr lang="en-US"/>
           </a:p>
@@ -2915,7 +2915,7 @@
           <a:p>
             <a:fld id="{0A38E50F-89CD-4F5B-9145-51D8E3359AEB}" type="datetimeFigureOut">
               <a:rPr lang="en-US" smtClean="0"/>
-              <a:t>5/27/2023</a:t>
+              <a:t>5/28/2023</a:t>
             </a:fld>
             <a:endParaRPr lang="en-US"/>
           </a:p>
@@ -5591,7 +5591,7 @@
         </p:nvSpPr>
         <p:spPr>
           <a:xfrm>
-            <a:off x="1925065" y="976744"/>
+            <a:off x="1463888" y="767693"/>
             <a:ext cx="3424830" cy="954107"/>
           </a:xfrm>
           <a:prstGeom prst="rect">
@@ -5608,17 +5608,186 @@
             <a:pPr algn="ctr"/>
             <a:r>
               <a:rPr lang="en-US" sz="2800" b="1" dirty="0"/>
-              <a:t>Calibration Accuracy Test</a:t>
+              <a:t>Triangulation Accuracy Test</a:t>
+            </a:r>
+          </a:p>
+        </p:txBody>
+      </p:sp>
+      <p:sp>
+        <p:nvSpPr>
+          <p:cNvPr id="8" name="TextBox 7">
+            <a:extLst>
+              <a:ext uri="{FF2B5EF4-FFF2-40B4-BE49-F238E27FC236}">
+                <a16:creationId xmlns:a16="http://schemas.microsoft.com/office/drawing/2014/main" id="{ACAA6263-1998-7503-813F-15295E56162A}"/>
+              </a:ext>
+            </a:extLst>
+          </p:cNvPr>
+          <p:cNvSpPr txBox="1"/>
+          <p:nvPr/>
+        </p:nvSpPr>
+        <p:spPr>
+          <a:xfrm rot="20693829">
+            <a:off x="5141092" y="2185578"/>
+            <a:ext cx="1150049" cy="369332"/>
+          </a:xfrm>
+          <a:prstGeom prst="rect">
+            <a:avLst/>
+          </a:prstGeom>
+          <a:noFill/>
+        </p:spPr>
+        <p:txBody>
+          <a:bodyPr wrap="square">
+            <a:spAutoFit/>
+          </a:bodyPr>
+          <a:lstStyle/>
+          <a:p>
+            <a:r>
+              <a:rPr lang="en-US" sz="1800" b="1" dirty="0"/>
+              <a:t>14 meters</a:t>
+            </a:r>
+            <a:endParaRPr lang="en-US" dirty="0"/>
+          </a:p>
+        </p:txBody>
+      </p:sp>
+      <p:sp>
+        <p:nvSpPr>
+          <p:cNvPr id="9" name="TextBox 8">
+            <a:extLst>
+              <a:ext uri="{FF2B5EF4-FFF2-40B4-BE49-F238E27FC236}">
+                <a16:creationId xmlns:a16="http://schemas.microsoft.com/office/drawing/2014/main" id="{65E26DF2-117F-9E72-FAA0-41BFCD7E2427}"/>
+              </a:ext>
+            </a:extLst>
+          </p:cNvPr>
+          <p:cNvSpPr txBox="1"/>
+          <p:nvPr/>
+        </p:nvSpPr>
+        <p:spPr>
+          <a:xfrm rot="417907">
+            <a:off x="5790928" y="3952413"/>
+            <a:ext cx="1150049" cy="369332"/>
+          </a:xfrm>
+          <a:prstGeom prst="rect">
+            <a:avLst/>
+          </a:prstGeom>
+          <a:noFill/>
+        </p:spPr>
+        <p:txBody>
+          <a:bodyPr wrap="square">
+            <a:spAutoFit/>
+          </a:bodyPr>
+          <a:lstStyle/>
+          <a:p>
+            <a:r>
+              <a:rPr lang="en-US" sz="1800" b="1" dirty="0"/>
+              <a:t>14 meters</a:t>
+            </a:r>
+            <a:endParaRPr lang="en-US" dirty="0"/>
+          </a:p>
+        </p:txBody>
+      </p:sp>
+      <p:sp>
+        <p:nvSpPr>
+          <p:cNvPr id="10" name="TextBox 9">
+            <a:extLst>
+              <a:ext uri="{FF2B5EF4-FFF2-40B4-BE49-F238E27FC236}">
+                <a16:creationId xmlns:a16="http://schemas.microsoft.com/office/drawing/2014/main" id="{74F2FC31-8733-2340-FFFA-0447ADDF2188}"/>
+              </a:ext>
+            </a:extLst>
+          </p:cNvPr>
+          <p:cNvSpPr txBox="1"/>
+          <p:nvPr/>
+        </p:nvSpPr>
+        <p:spPr>
+          <a:xfrm rot="3858822">
+            <a:off x="7766144" y="2684920"/>
+            <a:ext cx="2888952" cy="369332"/>
+          </a:xfrm>
+          <a:prstGeom prst="rect">
+            <a:avLst/>
+          </a:prstGeom>
+          <a:noFill/>
+        </p:spPr>
+        <p:txBody>
+          <a:bodyPr wrap="square">
+            <a:spAutoFit/>
+          </a:bodyPr>
+          <a:lstStyle/>
+          <a:p>
+            <a:pPr algn="ctr"/>
+            <a:r>
+              <a:rPr lang="en-US" sz="1800" b="1" dirty="0">
+                <a:solidFill>
+                  <a:srgbClr val="00B050"/>
+                </a:solidFill>
+              </a:rPr>
+              <a:t>7 meters</a:t>
+            </a:r>
+            <a:endParaRPr lang="en-US" dirty="0">
+              <a:solidFill>
+                <a:srgbClr val="00B050"/>
+              </a:solidFill>
+            </a:endParaRPr>
+          </a:p>
+        </p:txBody>
+      </p:sp>
+      <p:sp>
+        <p:nvSpPr>
+          <p:cNvPr id="6" name="TextBox 5">
+            <a:extLst>
+              <a:ext uri="{FF2B5EF4-FFF2-40B4-BE49-F238E27FC236}">
+                <a16:creationId xmlns:a16="http://schemas.microsoft.com/office/drawing/2014/main" id="{9E0E7BAB-AA71-2BDA-7F15-0B634B9220B5}"/>
+              </a:ext>
+            </a:extLst>
+          </p:cNvPr>
+          <p:cNvSpPr txBox="1"/>
+          <p:nvPr/>
+        </p:nvSpPr>
+        <p:spPr>
+          <a:xfrm>
+            <a:off x="1160544" y="5769682"/>
+            <a:ext cx="10029010" cy="369332"/>
+          </a:xfrm>
+          <a:prstGeom prst="rect">
+            <a:avLst/>
+          </a:prstGeom>
+          <a:noFill/>
+        </p:spPr>
+        <p:txBody>
+          <a:bodyPr wrap="square" rtlCol="0">
+            <a:spAutoFit/>
+          </a:bodyPr>
+          <a:lstStyle/>
+          <a:p>
+            <a:pPr algn="ctr"/>
+            <a:r>
+              <a:rPr lang="en-US" i="1" dirty="0" err="1"/>
+              <a:t>Efovee</a:t>
+            </a:r>
+            <a:r>
+              <a:rPr lang="en-US" i="1" dirty="0"/>
+              <a:t> calibrations measures the </a:t>
+            </a:r>
+            <a:r>
+              <a:rPr lang="en-US" b="1" i="1" dirty="0">
+                <a:solidFill>
+                  <a:srgbClr val="00B050"/>
+                </a:solidFill>
+              </a:rPr>
+              <a:t>target between distance </a:t>
+            </a:r>
+            <a:r>
+              <a:rPr lang="en-US" i="1" dirty="0"/>
+              <a:t>with an accuracy less than 11mm at this range!</a:t>
             </a:r>
           </a:p>
         </p:txBody>
       </p:sp>
       <p:cxnSp>
         <p:nvCxnSpPr>
-          <p:cNvPr id="3" name="Straight Connector 2">
-            <a:extLst>
-              <a:ext uri="{FF2B5EF4-FFF2-40B4-BE49-F238E27FC236}">
-                <a16:creationId xmlns:a16="http://schemas.microsoft.com/office/drawing/2014/main" id="{102CE199-9037-3403-9108-8DEEC52F6C5D}"/>
+          <p:cNvPr id="7" name="Straight Arrow Connector 6">
+            <a:extLst>
+              <a:ext uri="{FF2B5EF4-FFF2-40B4-BE49-F238E27FC236}">
+                <a16:creationId xmlns:a16="http://schemas.microsoft.com/office/drawing/2014/main" id="{6C99CFB8-519D-DC79-CA3F-4C761BF07A6A}"/>
               </a:ext>
             </a:extLst>
           </p:cNvPr>
@@ -5629,17 +5798,19 @@
         </p:nvCxnSpPr>
         <p:spPr>
           <a:xfrm flipH="1" flipV="1">
-            <a:off x="8344711" y="1727110"/>
-            <a:ext cx="1302414" cy="2665848"/>
-          </a:xfrm>
-          <a:prstGeom prst="line">
+            <a:off x="8336538" y="1755116"/>
+            <a:ext cx="1310587" cy="2634997"/>
+          </a:xfrm>
+          <a:prstGeom prst="straightConnector1">
             <a:avLst/>
           </a:prstGeom>
-          <a:ln w="28575">
+          <a:ln w="76200">
             <a:solidFill>
               <a:srgbClr val="00B050"/>
             </a:solidFill>
-            <a:prstDash val="lgDashDotDot"/>
+            <a:prstDash val="sysDash"/>
+            <a:headEnd type="triangle"/>
+            <a:tailEnd type="triangle"/>
           </a:ln>
         </p:spPr>
         <p:style>
@@ -5657,157 +5828,6 @@
           </a:fontRef>
         </p:style>
       </p:cxnSp>
-      <p:sp>
-        <p:nvSpPr>
-          <p:cNvPr id="8" name="TextBox 7">
-            <a:extLst>
-              <a:ext uri="{FF2B5EF4-FFF2-40B4-BE49-F238E27FC236}">
-                <a16:creationId xmlns:a16="http://schemas.microsoft.com/office/drawing/2014/main" id="{ACAA6263-1998-7503-813F-15295E56162A}"/>
-              </a:ext>
-            </a:extLst>
-          </p:cNvPr>
-          <p:cNvSpPr txBox="1"/>
-          <p:nvPr/>
-        </p:nvSpPr>
-        <p:spPr>
-          <a:xfrm rot="20693829">
-            <a:off x="5141092" y="2185578"/>
-            <a:ext cx="1150049" cy="369332"/>
-          </a:xfrm>
-          <a:prstGeom prst="rect">
-            <a:avLst/>
-          </a:prstGeom>
-          <a:noFill/>
-        </p:spPr>
-        <p:txBody>
-          <a:bodyPr wrap="square">
-            <a:spAutoFit/>
-          </a:bodyPr>
-          <a:lstStyle/>
-          <a:p>
-            <a:r>
-              <a:rPr lang="en-US" sz="1800" b="1" dirty="0"/>
-              <a:t>14 meters</a:t>
-            </a:r>
-            <a:endParaRPr lang="en-US" dirty="0"/>
-          </a:p>
-        </p:txBody>
-      </p:sp>
-      <p:sp>
-        <p:nvSpPr>
-          <p:cNvPr id="9" name="TextBox 8">
-            <a:extLst>
-              <a:ext uri="{FF2B5EF4-FFF2-40B4-BE49-F238E27FC236}">
-                <a16:creationId xmlns:a16="http://schemas.microsoft.com/office/drawing/2014/main" id="{65E26DF2-117F-9E72-FAA0-41BFCD7E2427}"/>
-              </a:ext>
-            </a:extLst>
-          </p:cNvPr>
-          <p:cNvSpPr txBox="1"/>
-          <p:nvPr/>
-        </p:nvSpPr>
-        <p:spPr>
-          <a:xfrm rot="417907">
-            <a:off x="5790928" y="3952413"/>
-            <a:ext cx="1150049" cy="369332"/>
-          </a:xfrm>
-          <a:prstGeom prst="rect">
-            <a:avLst/>
-          </a:prstGeom>
-          <a:noFill/>
-        </p:spPr>
-        <p:txBody>
-          <a:bodyPr wrap="square">
-            <a:spAutoFit/>
-          </a:bodyPr>
-          <a:lstStyle/>
-          <a:p>
-            <a:r>
-              <a:rPr lang="en-US" sz="1800" b="1" dirty="0"/>
-              <a:t>14 meters</a:t>
-            </a:r>
-            <a:endParaRPr lang="en-US" dirty="0"/>
-          </a:p>
-        </p:txBody>
-      </p:sp>
-      <p:sp>
-        <p:nvSpPr>
-          <p:cNvPr id="10" name="TextBox 9">
-            <a:extLst>
-              <a:ext uri="{FF2B5EF4-FFF2-40B4-BE49-F238E27FC236}">
-                <a16:creationId xmlns:a16="http://schemas.microsoft.com/office/drawing/2014/main" id="{74F2FC31-8733-2340-FFFA-0447ADDF2188}"/>
-              </a:ext>
-            </a:extLst>
-          </p:cNvPr>
-          <p:cNvSpPr txBox="1"/>
-          <p:nvPr/>
-        </p:nvSpPr>
-        <p:spPr>
-          <a:xfrm rot="3858822">
-            <a:off x="8566368" y="2703542"/>
-            <a:ext cx="1150049" cy="369332"/>
-          </a:xfrm>
-          <a:prstGeom prst="rect">
-            <a:avLst/>
-          </a:prstGeom>
-          <a:noFill/>
-        </p:spPr>
-        <p:txBody>
-          <a:bodyPr wrap="square">
-            <a:spAutoFit/>
-          </a:bodyPr>
-          <a:lstStyle/>
-          <a:p>
-            <a:r>
-              <a:rPr lang="en-US" sz="1800" b="1" dirty="0"/>
-              <a:t>7 meters</a:t>
-            </a:r>
-            <a:endParaRPr lang="en-US" dirty="0"/>
-          </a:p>
-        </p:txBody>
-      </p:sp>
-      <p:sp>
-        <p:nvSpPr>
-          <p:cNvPr id="6" name="TextBox 5">
-            <a:extLst>
-              <a:ext uri="{FF2B5EF4-FFF2-40B4-BE49-F238E27FC236}">
-                <a16:creationId xmlns:a16="http://schemas.microsoft.com/office/drawing/2014/main" id="{9E0E7BAB-AA71-2BDA-7F15-0B634B9220B5}"/>
-              </a:ext>
-            </a:extLst>
-          </p:cNvPr>
-          <p:cNvSpPr txBox="1"/>
-          <p:nvPr/>
-        </p:nvSpPr>
-        <p:spPr>
-          <a:xfrm>
-            <a:off x="1248589" y="5763728"/>
-            <a:ext cx="9694822" cy="646331"/>
-          </a:xfrm>
-          <a:prstGeom prst="rect">
-            <a:avLst/>
-          </a:prstGeom>
-          <a:noFill/>
-        </p:spPr>
-        <p:txBody>
-          <a:bodyPr wrap="square" rtlCol="0">
-            <a:spAutoFit/>
-          </a:bodyPr>
-          <a:lstStyle/>
-          <a:p>
-            <a:pPr algn="ctr"/>
-            <a:r>
-              <a:rPr lang="en-US" i="1" dirty="0" err="1"/>
-              <a:t>Efovee</a:t>
-            </a:r>
-            <a:r>
-              <a:rPr lang="en-US" i="1" dirty="0"/>
-              <a:t> calibrations measure less than 12mm in error at this range!</a:t>
-            </a:r>
-          </a:p>
-          <a:p>
-            <a:endParaRPr lang="en-US" i="1" dirty="0"/>
-          </a:p>
-        </p:txBody>
-      </p:sp>
     </p:spTree>
     <p:extLst>
       <p:ext uri="{BB962C8B-B14F-4D97-AF65-F5344CB8AC3E}">

</xml_diff>